<commit_message>
add 12-13 des 2020
</commit_message>
<xml_diff>
--- a/2020 12 tanggal 5 - 6/Slide Misa Bahasa Sunda.pptx
+++ b/2020 12 tanggal 5 - 6/Slide Misa Bahasa Sunda.pptx
@@ -475,7 +475,7 @@
             <a:fld id="{B61BEF0D-F0BB-DE4B-95CE-6DB70DBA9567}" type="datetimeFigureOut">
               <a:rPr lang="en-US" smtClean="0"/>
               <a:pPr/>
-              <a:t>12/4/2020</a:t>
+              <a:t>12/6/2020</a:t>
             </a:fld>
             <a:endParaRPr lang="en-US" dirty="0"/>
           </a:p>
@@ -775,7 +775,7 @@
             <a:fld id="{B61BEF0D-F0BB-DE4B-95CE-6DB70DBA9567}" type="datetimeFigureOut">
               <a:rPr lang="en-US" smtClean="0"/>
               <a:pPr/>
-              <a:t>12/4/2020</a:t>
+              <a:t>12/6/2020</a:t>
             </a:fld>
             <a:endParaRPr lang="en-US" dirty="0"/>
           </a:p>
@@ -969,7 +969,7 @@
             <a:fld id="{B61BEF0D-F0BB-DE4B-95CE-6DB70DBA9567}" type="datetimeFigureOut">
               <a:rPr lang="en-US" smtClean="0"/>
               <a:pPr/>
-              <a:t>12/4/2020</a:t>
+              <a:t>12/6/2020</a:t>
             </a:fld>
             <a:endParaRPr lang="en-US" dirty="0"/>
           </a:p>
@@ -1232,7 +1232,7 @@
             <a:fld id="{B61BEF0D-F0BB-DE4B-95CE-6DB70DBA9567}" type="datetimeFigureOut">
               <a:rPr lang="en-US" smtClean="0"/>
               <a:pPr/>
-              <a:t>12/4/2020</a:t>
+              <a:t>12/6/2020</a:t>
             </a:fld>
             <a:endParaRPr lang="en-US" dirty="0"/>
           </a:p>
@@ -1658,7 +1658,7 @@
             <a:fld id="{B61BEF0D-F0BB-DE4B-95CE-6DB70DBA9567}" type="datetimeFigureOut">
               <a:rPr lang="en-US" smtClean="0"/>
               <a:pPr/>
-              <a:t>12/4/2020</a:t>
+              <a:t>12/6/2020</a:t>
             </a:fld>
             <a:endParaRPr lang="en-US" dirty="0"/>
           </a:p>
@@ -2197,7 +2197,7 @@
             <a:fld id="{B61BEF0D-F0BB-DE4B-95CE-6DB70DBA9567}" type="datetimeFigureOut">
               <a:rPr lang="en-US" smtClean="0"/>
               <a:pPr/>
-              <a:t>12/4/2020</a:t>
+              <a:t>12/6/2020</a:t>
             </a:fld>
             <a:endParaRPr lang="en-US" dirty="0"/>
           </a:p>
@@ -3063,7 +3063,7 @@
             <a:fld id="{B61BEF0D-F0BB-DE4B-95CE-6DB70DBA9567}" type="datetimeFigureOut">
               <a:rPr lang="en-US" smtClean="0"/>
               <a:pPr/>
-              <a:t>12/4/2020</a:t>
+              <a:t>12/6/2020</a:t>
             </a:fld>
             <a:endParaRPr lang="en-US" dirty="0"/>
           </a:p>
@@ -3234,7 +3234,7 @@
           <a:p>
             <a:fld id="{55C6B4A9-1611-4792-9094-5F34BCA07E0B}" type="datetimeFigureOut">
               <a:rPr lang="en-US" smtClean="0"/>
-              <a:t>12/4/2020</a:t>
+              <a:t>12/6/2020</a:t>
             </a:fld>
             <a:endParaRPr lang="en-US" dirty="0"/>
           </a:p>
@@ -3419,7 +3419,7 @@
             <a:fld id="{B61BEF0D-F0BB-DE4B-95CE-6DB70DBA9567}" type="datetimeFigureOut">
               <a:rPr lang="en-US" smtClean="0"/>
               <a:pPr/>
-              <a:t>12/4/2020</a:t>
+              <a:t>12/6/2020</a:t>
             </a:fld>
             <a:endParaRPr lang="en-US" dirty="0"/>
           </a:p>
@@ -3591,7 +3591,7 @@
             <a:fld id="{B61BEF0D-F0BB-DE4B-95CE-6DB70DBA9567}" type="datetimeFigureOut">
               <a:rPr lang="en-US" smtClean="0"/>
               <a:pPr/>
-              <a:t>12/4/2020</a:t>
+              <a:t>12/6/2020</a:t>
             </a:fld>
             <a:endParaRPr lang="en-US" dirty="0"/>
           </a:p>
@@ -3837,7 +3837,7 @@
             <a:fld id="{B61BEF0D-F0BB-DE4B-95CE-6DB70DBA9567}" type="datetimeFigureOut">
               <a:rPr lang="en-US" smtClean="0"/>
               <a:pPr/>
-              <a:t>12/4/2020</a:t>
+              <a:t>12/6/2020</a:t>
             </a:fld>
             <a:endParaRPr lang="en-US" dirty="0"/>
           </a:p>
@@ -4074,7 +4074,7 @@
           <a:p>
             <a:fld id="{EB712588-04B1-427B-82EE-E8DB90309F08}" type="datetimeFigureOut">
               <a:rPr lang="en-US" smtClean="0"/>
-              <a:t>12/4/2020</a:t>
+              <a:t>12/6/2020</a:t>
             </a:fld>
             <a:endParaRPr lang="en-US" dirty="0"/>
           </a:p>
@@ -4541,7 +4541,7 @@
             <a:fld id="{B61BEF0D-F0BB-DE4B-95CE-6DB70DBA9567}" type="datetimeFigureOut">
               <a:rPr lang="en-US" smtClean="0"/>
               <a:pPr/>
-              <a:t>12/4/2020</a:t>
+              <a:t>12/6/2020</a:t>
             </a:fld>
             <a:endParaRPr lang="en-US" dirty="0"/>
           </a:p>
@@ -4661,7 +4661,7 @@
             <a:fld id="{B61BEF0D-F0BB-DE4B-95CE-6DB70DBA9567}" type="datetimeFigureOut">
               <a:rPr lang="en-US" smtClean="0"/>
               <a:pPr/>
-              <a:t>12/4/2020</a:t>
+              <a:t>12/6/2020</a:t>
             </a:fld>
             <a:endParaRPr lang="en-US" dirty="0"/>
           </a:p>
@@ -4758,7 +4758,7 @@
             <a:fld id="{B61BEF0D-F0BB-DE4B-95CE-6DB70DBA9567}" type="datetimeFigureOut">
               <a:rPr lang="en-US" smtClean="0"/>
               <a:pPr/>
-              <a:t>12/4/2020</a:t>
+              <a:t>12/6/2020</a:t>
             </a:fld>
             <a:endParaRPr lang="en-US" dirty="0"/>
           </a:p>
@@ -5014,7 +5014,7 @@
           <a:p>
             <a:fld id="{42A54C80-263E-416B-A8E0-580EDEADCBDC}" type="datetimeFigureOut">
               <a:rPr lang="en-US" smtClean="0"/>
-              <a:t>12/4/2020</a:t>
+              <a:t>12/6/2020</a:t>
             </a:fld>
             <a:endParaRPr lang="en-US" dirty="0"/>
           </a:p>
@@ -5315,7 +5315,7 @@
             <a:fld id="{B61BEF0D-F0BB-DE4B-95CE-6DB70DBA9567}" type="datetimeFigureOut">
               <a:rPr lang="en-US" smtClean="0"/>
               <a:pPr/>
-              <a:t>12/4/2020</a:t>
+              <a:t>12/6/2020</a:t>
             </a:fld>
             <a:endParaRPr lang="en-US" dirty="0"/>
           </a:p>
@@ -5551,7 +5551,7 @@
             <a:fld id="{B61BEF0D-F0BB-DE4B-95CE-6DB70DBA9567}" type="datetimeFigureOut">
               <a:rPr lang="en-US" smtClean="0"/>
               <a:pPr/>
-              <a:t>12/4/2020</a:t>
+              <a:t>12/6/2020</a:t>
             </a:fld>
             <a:endParaRPr lang="en-US" dirty="0"/>
           </a:p>
@@ -6272,16 +6272,7 @@
                 </a:solidFill>
                 <a:latin typeface="Arial Black" panose="020B0A04020102020204" pitchFamily="34" charset="0"/>
               </a:rPr>
-              <a:t>MINGGU ADVEN </a:t>
-            </a:r>
-            <a:r>
-              <a:rPr lang="en-ID" sz="4800" dirty="0" smtClean="0">
-                <a:solidFill>
-                  <a:srgbClr val="FFFF00"/>
-                </a:solidFill>
-                <a:latin typeface="Arial Black" panose="020B0A04020102020204" pitchFamily="34" charset="0"/>
-              </a:rPr>
-              <a:t>II</a:t>
+              <a:t>MINGGU ADVEN II</a:t>
             </a:r>
             <a:endParaRPr lang="en-US" sz="4800" dirty="0">
               <a:solidFill>
@@ -6328,15 +6319,7 @@
                   <a:srgbClr val="FFFF00"/>
                 </a:solidFill>
               </a:rPr>
-              <a:t>, </a:t>
-            </a:r>
-            <a:r>
-              <a:rPr lang="en-ID" sz="4000" dirty="0" smtClean="0">
-                <a:solidFill>
-                  <a:srgbClr val="FFFF00"/>
-                </a:solidFill>
-              </a:rPr>
-              <a:t>6 </a:t>
+              <a:t>, 6 </a:t>
             </a:r>
             <a:r>
               <a:rPr lang="en-ID" sz="4000" dirty="0" err="1" smtClean="0">
@@ -8461,7 +8444,31 @@
                 <a:ea typeface="Calibri" panose="020F0502020204030204" pitchFamily="34" charset="0"/>
                 <a:cs typeface="Times New Roman" panose="02020603050405020304" pitchFamily="18" charset="0"/>
               </a:rPr>
-              <a:t> manga </a:t>
+              <a:t> </a:t>
+            </a:r>
+            <a:r>
+              <a:rPr lang="en-ID" sz="5400" dirty="0" err="1" smtClean="0">
+                <a:solidFill>
+                  <a:srgbClr val="FFFF00"/>
+                </a:solidFill>
+                <a:effectLst/>
+                <a:latin typeface="Arial Black" panose="020B0A04020102020204" pitchFamily="34" charset="0"/>
+                <a:ea typeface="Calibri" panose="020F0502020204030204" pitchFamily="34" charset="0"/>
+                <a:cs typeface="Times New Roman" panose="02020603050405020304" pitchFamily="18" charset="0"/>
+              </a:rPr>
+              <a:t>mangga</a:t>
+            </a:r>
+            <a:r>
+              <a:rPr lang="en-ID" sz="5400" dirty="0" smtClean="0">
+                <a:solidFill>
+                  <a:srgbClr val="FFFF00"/>
+                </a:solidFill>
+                <a:effectLst/>
+                <a:latin typeface="Arial Black" panose="020B0A04020102020204" pitchFamily="34" charset="0"/>
+                <a:ea typeface="Calibri" panose="020F0502020204030204" pitchFamily="34" charset="0"/>
+                <a:cs typeface="Times New Roman" panose="02020603050405020304" pitchFamily="18" charset="0"/>
+              </a:rPr>
+              <a:t> </a:t>
             </a:r>
             <a:r>
               <a:rPr lang="en-ID" sz="5400" dirty="0" err="1">
@@ -8538,7 +8545,7 @@
               <a:t> </a:t>
             </a:r>
             <a:r>
-              <a:rPr lang="en-ID" sz="5400" dirty="0" err="1">
+              <a:rPr lang="en-ID" sz="5400" dirty="0" err="1" smtClean="0">
                 <a:solidFill>
                   <a:srgbClr val="FFFF00"/>
                 </a:solidFill>
@@ -8547,10 +8554,10 @@
                 <a:ea typeface="Calibri" panose="020F0502020204030204" pitchFamily="34" charset="0"/>
                 <a:cs typeface="Times New Roman" panose="02020603050405020304" pitchFamily="18" charset="0"/>
               </a:rPr>
-              <a:t>keu</a:t>
-            </a:r>
-            <a:r>
-              <a:rPr lang="en-ID" sz="5400" dirty="0">
+              <a:t>keur</a:t>
+            </a:r>
+            <a:r>
+              <a:rPr lang="en-ID" sz="5400" dirty="0" smtClean="0">
                 <a:solidFill>
                   <a:srgbClr val="FFFF00"/>
                 </a:solidFill>
@@ -9286,28 +9293,15 @@
             <a:pPr marL="0" indent="0" algn="ctr">
               <a:buNone/>
             </a:pPr>
-            <a:endParaRPr lang="en-ID" sz="6000" dirty="0" smtClean="0">
-              <a:solidFill>
-                <a:srgbClr val="FFFF00"/>
-              </a:solidFill>
-              <a:latin typeface="Arial Black" panose="020B0A04020102020204" pitchFamily="34" charset="0"/>
-            </a:endParaRPr>
-          </a:p>
-          <a:p>
-            <a:pPr marL="0" indent="0" algn="ctr">
-              <a:buNone/>
-            </a:pPr>
-            <a:endParaRPr lang="en-ID" sz="6000" dirty="0">
-              <a:solidFill>
-                <a:srgbClr val="FFFF00"/>
-              </a:solidFill>
-              <a:latin typeface="Arial Black" panose="020B0A04020102020204" pitchFamily="34" charset="0"/>
-            </a:endParaRPr>
-          </a:p>
-          <a:p>
-            <a:pPr marL="0" indent="0" algn="ctr">
-              <a:buNone/>
-            </a:pPr>
+            <a:r>
+              <a:rPr lang="en-ID" sz="6000" dirty="0" err="1" smtClean="0">
+                <a:solidFill>
+                  <a:srgbClr val="FFFF00"/>
+                </a:solidFill>
+                <a:latin typeface="Arial Black" panose="020B0A04020102020204" pitchFamily="34" charset="0"/>
+              </a:rPr>
+              <a:t>Pintonkeun</a:t>
+            </a:r>
             <a:r>
               <a:rPr lang="en-ID" sz="6000" dirty="0" smtClean="0">
                 <a:solidFill>
@@ -9315,7 +9309,223 @@
                 </a:solidFill>
                 <a:latin typeface="Arial Black" panose="020B0A04020102020204" pitchFamily="34" charset="0"/>
               </a:rPr>
-              <a:t>----- ? -----</a:t>
+              <a:t> </a:t>
+            </a:r>
+            <a:r>
+              <a:rPr lang="en-ID" sz="6000" dirty="0" err="1" smtClean="0">
+                <a:solidFill>
+                  <a:srgbClr val="FFFF00"/>
+                </a:solidFill>
+                <a:latin typeface="Arial Black" panose="020B0A04020102020204" pitchFamily="34" charset="0"/>
+              </a:rPr>
+              <a:t>ka</a:t>
+            </a:r>
+            <a:r>
+              <a:rPr lang="en-ID" sz="6000" dirty="0" smtClean="0">
+                <a:solidFill>
+                  <a:srgbClr val="FFFF00"/>
+                </a:solidFill>
+                <a:latin typeface="Arial Black" panose="020B0A04020102020204" pitchFamily="34" charset="0"/>
+              </a:rPr>
+              <a:t> </a:t>
+            </a:r>
+            <a:r>
+              <a:rPr lang="en-ID" sz="6000" dirty="0" err="1" smtClean="0">
+                <a:solidFill>
+                  <a:srgbClr val="FFFF00"/>
+                </a:solidFill>
+                <a:latin typeface="Arial Black" panose="020B0A04020102020204" pitchFamily="34" charset="0"/>
+              </a:rPr>
+              <a:t>abdi-abdi</a:t>
+            </a:r>
+            <a:r>
+              <a:rPr lang="en-ID" sz="6000" dirty="0" smtClean="0">
+                <a:solidFill>
+                  <a:srgbClr val="FFFF00"/>
+                </a:solidFill>
+                <a:latin typeface="Arial Black" panose="020B0A04020102020204" pitchFamily="34" charset="0"/>
+              </a:rPr>
+              <a:t> </a:t>
+            </a:r>
+            <a:r>
+              <a:rPr lang="en-ID" sz="6000" dirty="0" err="1" smtClean="0">
+                <a:solidFill>
+                  <a:srgbClr val="FFFF00"/>
+                </a:solidFill>
+                <a:latin typeface="Arial Black" panose="020B0A04020102020204" pitchFamily="34" charset="0"/>
+              </a:rPr>
+              <a:t>kaasih-satia</a:t>
+            </a:r>
+            <a:r>
+              <a:rPr lang="en-ID" sz="6000" dirty="0" smtClean="0">
+                <a:solidFill>
+                  <a:srgbClr val="FFFF00"/>
+                </a:solidFill>
+                <a:latin typeface="Arial Black" panose="020B0A04020102020204" pitchFamily="34" charset="0"/>
+              </a:rPr>
+              <a:t> </a:t>
+            </a:r>
+            <a:r>
+              <a:rPr lang="en-ID" sz="6000" dirty="0" err="1" smtClean="0">
+                <a:solidFill>
+                  <a:srgbClr val="FFFF00"/>
+                </a:solidFill>
+                <a:latin typeface="Arial Black" panose="020B0A04020102020204" pitchFamily="34" charset="0"/>
+              </a:rPr>
+              <a:t>Gusti</a:t>
+            </a:r>
+            <a:r>
+              <a:rPr lang="en-ID" sz="6000" dirty="0" smtClean="0">
+                <a:solidFill>
+                  <a:srgbClr val="FFFF00"/>
+                </a:solidFill>
+                <a:latin typeface="Arial Black" panose="020B0A04020102020204" pitchFamily="34" charset="0"/>
+              </a:rPr>
+              <a:t>, nun </a:t>
+            </a:r>
+            <a:r>
+              <a:rPr lang="en-ID" sz="6000" dirty="0" err="1" smtClean="0">
+                <a:solidFill>
+                  <a:srgbClr val="FFFF00"/>
+                </a:solidFill>
+                <a:latin typeface="Arial Black" panose="020B0A04020102020204" pitchFamily="34" charset="0"/>
+              </a:rPr>
+              <a:t>Pangèran</a:t>
+            </a:r>
+            <a:r>
+              <a:rPr lang="en-ID" sz="6000" dirty="0" smtClean="0">
+                <a:solidFill>
+                  <a:srgbClr val="FFFF00"/>
+                </a:solidFill>
+                <a:latin typeface="Arial Black" panose="020B0A04020102020204" pitchFamily="34" charset="0"/>
+              </a:rPr>
+              <a:t>, </a:t>
+            </a:r>
+            <a:r>
+              <a:rPr lang="en-ID" sz="6000" dirty="0" err="1" smtClean="0">
+                <a:solidFill>
+                  <a:srgbClr val="FFFF00"/>
+                </a:solidFill>
+                <a:latin typeface="Arial Black" panose="020B0A04020102020204" pitchFamily="34" charset="0"/>
+              </a:rPr>
+              <a:t>sareng</a:t>
+            </a:r>
+            <a:r>
+              <a:rPr lang="en-ID" sz="6000" dirty="0" smtClean="0">
+                <a:solidFill>
+                  <a:srgbClr val="FFFF00"/>
+                </a:solidFill>
+                <a:latin typeface="Arial Black" panose="020B0A04020102020204" pitchFamily="34" charset="0"/>
+              </a:rPr>
+              <a:t> </a:t>
+            </a:r>
+            <a:r>
+              <a:rPr lang="en-ID" sz="6000" dirty="0" err="1" smtClean="0">
+                <a:solidFill>
+                  <a:srgbClr val="FFFF00"/>
+                </a:solidFill>
+                <a:latin typeface="Arial Black" panose="020B0A04020102020204" pitchFamily="34" charset="0"/>
+              </a:rPr>
+              <a:t>paparin</a:t>
+            </a:r>
+            <a:r>
+              <a:rPr lang="en-ID" sz="6000" dirty="0" smtClean="0">
+                <a:solidFill>
+                  <a:srgbClr val="FFFF00"/>
+                </a:solidFill>
+                <a:latin typeface="Arial Black" panose="020B0A04020102020204" pitchFamily="34" charset="0"/>
+              </a:rPr>
+              <a:t> </a:t>
+            </a:r>
+            <a:r>
+              <a:rPr lang="en-ID" sz="6000" dirty="0" err="1" smtClean="0">
+                <a:solidFill>
+                  <a:srgbClr val="FFFF00"/>
+                </a:solidFill>
+                <a:latin typeface="Arial Black" panose="020B0A04020102020204" pitchFamily="34" charset="0"/>
+              </a:rPr>
+              <a:t>kasalametan</a:t>
+            </a:r>
+            <a:r>
+              <a:rPr lang="en-ID" sz="6000" dirty="0" smtClean="0">
+                <a:solidFill>
+                  <a:srgbClr val="FFFF00"/>
+                </a:solidFill>
+                <a:latin typeface="Arial Black" panose="020B0A04020102020204" pitchFamily="34" charset="0"/>
+              </a:rPr>
+              <a:t> </a:t>
+            </a:r>
+            <a:r>
+              <a:rPr lang="en-ID" sz="6000" dirty="0" err="1" smtClean="0">
+                <a:solidFill>
+                  <a:srgbClr val="FFFF00"/>
+                </a:solidFill>
+                <a:latin typeface="Arial Black" panose="020B0A04020102020204" pitchFamily="34" charset="0"/>
+              </a:rPr>
+              <a:t>anu</a:t>
+            </a:r>
+            <a:r>
+              <a:rPr lang="en-ID" sz="6000" dirty="0" smtClean="0">
+                <a:solidFill>
+                  <a:srgbClr val="FFFF00"/>
+                </a:solidFill>
+                <a:latin typeface="Arial Black" panose="020B0A04020102020204" pitchFamily="34" charset="0"/>
+              </a:rPr>
+              <a:t> </a:t>
+            </a:r>
+            <a:r>
+              <a:rPr lang="en-ID" sz="6000" dirty="0" err="1" smtClean="0">
+                <a:solidFill>
+                  <a:srgbClr val="FFFF00"/>
+                </a:solidFill>
+                <a:latin typeface="Arial Black" panose="020B0A04020102020204" pitchFamily="34" charset="0"/>
+              </a:rPr>
+              <a:t>kawitna</a:t>
+            </a:r>
+            <a:r>
+              <a:rPr lang="en-ID" sz="6000" dirty="0" smtClean="0">
+                <a:solidFill>
+                  <a:srgbClr val="FFFF00"/>
+                </a:solidFill>
+                <a:latin typeface="Arial Black" panose="020B0A04020102020204" pitchFamily="34" charset="0"/>
+              </a:rPr>
+              <a:t> </a:t>
+            </a:r>
+            <a:r>
+              <a:rPr lang="en-ID" sz="6000" dirty="0" err="1" smtClean="0">
+                <a:solidFill>
+                  <a:srgbClr val="FFFF00"/>
+                </a:solidFill>
+                <a:latin typeface="Arial Black" panose="020B0A04020102020204" pitchFamily="34" charset="0"/>
+              </a:rPr>
+              <a:t>ti</a:t>
+            </a:r>
+            <a:r>
+              <a:rPr lang="en-ID" sz="6000" dirty="0" smtClean="0">
+                <a:solidFill>
+                  <a:srgbClr val="FFFF00"/>
+                </a:solidFill>
+                <a:latin typeface="Arial Black" panose="020B0A04020102020204" pitchFamily="34" charset="0"/>
+              </a:rPr>
+              <a:t> </a:t>
+            </a:r>
+            <a:r>
+              <a:rPr lang="en-ID" sz="6000" dirty="0" err="1" smtClean="0">
+                <a:solidFill>
+                  <a:srgbClr val="FFFF00"/>
+                </a:solidFill>
+                <a:latin typeface="Arial Black" panose="020B0A04020102020204" pitchFamily="34" charset="0"/>
+              </a:rPr>
+              <a:t>Gusti</a:t>
+            </a:r>
+            <a:r>
+              <a:rPr lang="en-ID" sz="6000" dirty="0" smtClean="0">
+                <a:solidFill>
+                  <a:srgbClr val="FFFF00"/>
+                </a:solidFill>
+                <a:latin typeface="Arial Black" panose="020B0A04020102020204" pitchFamily="34" charset="0"/>
+              </a:rPr>
+              <a:t> </a:t>
             </a:r>
             <a:endParaRPr lang="en-US" sz="6000" dirty="0">
               <a:solidFill>
@@ -10436,8 +10646,29 @@
                 <a:ea typeface="Calibri" panose="020F0502020204030204" pitchFamily="34" charset="0"/>
                 <a:cs typeface="Times New Roman" panose="02020603050405020304" pitchFamily="18" charset="0"/>
               </a:rPr>
-              <a:t>caket Immanuel</a:t>
-            </a:r>
+              <a:t>caket </a:t>
+            </a:r>
+            <a:r>
+              <a:rPr lang="sv-SE" sz="6000" dirty="0" smtClean="0">
+                <a:solidFill>
+                  <a:srgbClr val="FFFF00"/>
+                </a:solidFill>
+                <a:effectLst/>
+                <a:latin typeface="Arial Black" panose="020B0A04020102020204" pitchFamily="34" charset="0"/>
+                <a:ea typeface="Calibri" panose="020F0502020204030204" pitchFamily="34" charset="0"/>
+                <a:cs typeface="Times New Roman" panose="02020603050405020304" pitchFamily="18" charset="0"/>
+              </a:rPr>
+              <a:t>Emmanuel</a:t>
+            </a:r>
+            <a:endParaRPr lang="sv-SE" sz="6000" dirty="0">
+              <a:solidFill>
+                <a:srgbClr val="FFFF00"/>
+              </a:solidFill>
+              <a:effectLst/>
+              <a:latin typeface="Arial Black" panose="020B0A04020102020204" pitchFamily="34" charset="0"/>
+              <a:ea typeface="Calibri" panose="020F0502020204030204" pitchFamily="34" charset="0"/>
+              <a:cs typeface="Times New Roman" panose="02020603050405020304" pitchFamily="18" charset="0"/>
+            </a:endParaRPr>
           </a:p>
           <a:p>
             <a:pPr marL="0" indent="0" algn="ctr">
@@ -14186,8 +14417,29 @@
                 <a:ea typeface="Calibri" panose="020F0502020204030204" pitchFamily="34" charset="0"/>
                 <a:cs typeface="Times New Roman" panose="02020603050405020304" pitchFamily="18" charset="0"/>
               </a:rPr>
-              <a:t>caket Immanuel</a:t>
-            </a:r>
+              <a:t>caket </a:t>
+            </a:r>
+            <a:r>
+              <a:rPr lang="sv-SE" sz="6000" dirty="0" smtClean="0">
+                <a:solidFill>
+                  <a:srgbClr val="FFFF00"/>
+                </a:solidFill>
+                <a:effectLst/>
+                <a:latin typeface="Arial Black" panose="020B0A04020102020204" pitchFamily="34" charset="0"/>
+                <a:ea typeface="Calibri" panose="020F0502020204030204" pitchFamily="34" charset="0"/>
+                <a:cs typeface="Times New Roman" panose="02020603050405020304" pitchFamily="18" charset="0"/>
+              </a:rPr>
+              <a:t>Emmanuel</a:t>
+            </a:r>
+            <a:endParaRPr lang="sv-SE" sz="6000" dirty="0">
+              <a:solidFill>
+                <a:srgbClr val="FFFF00"/>
+              </a:solidFill>
+              <a:effectLst/>
+              <a:latin typeface="Arial Black" panose="020B0A04020102020204" pitchFamily="34" charset="0"/>
+              <a:ea typeface="Calibri" panose="020F0502020204030204" pitchFamily="34" charset="0"/>
+              <a:cs typeface="Times New Roman" panose="02020603050405020304" pitchFamily="18" charset="0"/>
+            </a:endParaRPr>
           </a:p>
           <a:p>
             <a:pPr marL="0" indent="0" algn="ctr">
@@ -14705,10 +14957,19 @@
                 </a:solidFill>
                 <a:latin typeface="Arial Black" panose="020B0A04020102020204" pitchFamily="34" charset="0"/>
               </a:rPr>
-              <a:t>maha</a:t>
-            </a:r>
-            <a:r>
-              <a:rPr lang="en-US" sz="5400" b="1" dirty="0">
+              <a:t>M</a:t>
+            </a:r>
+            <a:r>
+              <a:rPr lang="en-US" sz="5400" b="1" dirty="0" err="1" smtClean="0">
+                <a:solidFill>
+                  <a:srgbClr val="FFFF00"/>
+                </a:solidFill>
+                <a:latin typeface="Arial Black" panose="020B0A04020102020204" pitchFamily="34" charset="0"/>
+              </a:rPr>
+              <a:t>aha</a:t>
+            </a:r>
+            <a:r>
+              <a:rPr lang="en-US" sz="5400" b="1" dirty="0" smtClean="0">
                 <a:solidFill>
                   <a:srgbClr val="FFFF00"/>
                 </a:solidFill>
@@ -14832,13 +15093,31 @@
               <a:buNone/>
             </a:pPr>
             <a:r>
-              <a:rPr lang="en-US" sz="5400" b="1" dirty="0">
-                <a:solidFill>
-                  <a:srgbClr val="FFFF00"/>
-                </a:solidFill>
-                <a:latin typeface="Arial Black" panose="020B0A04020102020204" pitchFamily="34" charset="0"/>
-              </a:rPr>
-              <a:t>Abdi </a:t>
+              <a:rPr lang="en-US" sz="5400" b="1" dirty="0" smtClean="0">
+                <a:solidFill>
+                  <a:srgbClr val="FFFF00"/>
+                </a:solidFill>
+                <a:latin typeface="Arial Black" panose="020B0A04020102020204" pitchFamily="34" charset="0"/>
+              </a:rPr>
+              <a:t>Abdi-</a:t>
+            </a:r>
+            <a:r>
+              <a:rPr lang="en-US" sz="5400" b="1" dirty="0" err="1" smtClean="0">
+                <a:solidFill>
+                  <a:srgbClr val="FFFF00"/>
+                </a:solidFill>
+                <a:latin typeface="Arial Black" panose="020B0A04020102020204" pitchFamily="34" charset="0"/>
+              </a:rPr>
+              <a:t>abdi</a:t>
+            </a:r>
+            <a:r>
+              <a:rPr lang="en-US" sz="5400" b="1" dirty="0" smtClean="0">
+                <a:solidFill>
+                  <a:srgbClr val="FFFF00"/>
+                </a:solidFill>
+                <a:latin typeface="Arial Black" panose="020B0A04020102020204" pitchFamily="34" charset="0"/>
+              </a:rPr>
+              <a:t> </a:t>
             </a:r>
             <a:r>
               <a:rPr lang="en-US" sz="5400" b="1" dirty="0" err="1">
@@ -15236,16 +15515,16 @@
               <a:t> </a:t>
             </a:r>
             <a:r>
-              <a:rPr lang="en-US" sz="5400" b="1" dirty="0" err="1">
-                <a:solidFill>
-                  <a:srgbClr val="FFFF00"/>
-                </a:solidFill>
-                <a:latin typeface="Arial Black" panose="020B0A04020102020204" pitchFamily="34" charset="0"/>
-              </a:rPr>
-              <a:t>iklas</a:t>
-            </a:r>
-            <a:r>
-              <a:rPr lang="en-US" sz="5400" b="1" dirty="0">
+              <a:rPr lang="en-US" sz="5400" b="1" dirty="0" err="1" smtClean="0">
+                <a:solidFill>
+                  <a:srgbClr val="FFFF00"/>
+                </a:solidFill>
+                <a:latin typeface="Arial Black" panose="020B0A04020102020204" pitchFamily="34" charset="0"/>
+              </a:rPr>
+              <a:t>ikhlas</a:t>
+            </a:r>
+            <a:r>
+              <a:rPr lang="en-US" sz="5400" b="1" dirty="0" smtClean="0">
                 <a:solidFill>
                   <a:srgbClr val="FFFF00"/>
                 </a:solidFill>
@@ -15253,12 +15532,6 @@
               </a:rPr>
               <a:t> </a:t>
             </a:r>
-            <a:endParaRPr lang="en-US" sz="5400" b="1" dirty="0" smtClean="0">
-              <a:solidFill>
-                <a:srgbClr val="FFFF00"/>
-              </a:solidFill>
-              <a:latin typeface="Arial Black" panose="020B0A04020102020204" pitchFamily="34" charset="0"/>
-            </a:endParaRPr>
           </a:p>
           <a:p>
             <a:pPr marL="0" indent="0" algn="ctr">
@@ -15661,8 +15934,8 @@
         </p:nvSpPr>
         <p:spPr>
           <a:xfrm>
-            <a:off x="185530" y="1321908"/>
-            <a:ext cx="12006470" cy="4195481"/>
+            <a:off x="185530" y="1139688"/>
+            <a:ext cx="12006470" cy="5194852"/>
           </a:xfrm>
         </p:spPr>
         <p:txBody>
@@ -15776,7 +16049,7 @@
               <a:t> nu </a:t>
             </a:r>
             <a:r>
-              <a:rPr lang="en-US" sz="5400" b="1" dirty="0" err="1">
+              <a:rPr lang="en-US" sz="5400" b="1" dirty="0" err="1" smtClean="0">
                 <a:solidFill>
                   <a:srgbClr val="FFFF00"/>
                 </a:solidFill>
@@ -15785,7 +16058,25 @@
               <a:t>pinuh</a:t>
             </a:r>
             <a:r>
-              <a:rPr lang="en-US" sz="5400" b="1" dirty="0">
+              <a:rPr lang="en-US" sz="5400" b="1" dirty="0" smtClean="0">
+                <a:solidFill>
+                  <a:srgbClr val="FFFF00"/>
+                </a:solidFill>
+                <a:latin typeface="Arial Black" panose="020B0A04020102020204" pitchFamily="34" charset="0"/>
+              </a:rPr>
+              <a:t> </a:t>
+            </a:r>
+            <a:r>
+              <a:rPr lang="en-US" sz="5400" b="1" dirty="0" err="1" smtClean="0">
+                <a:solidFill>
+                  <a:srgbClr val="FFFF00"/>
+                </a:solidFill>
+                <a:latin typeface="Arial Black" panose="020B0A04020102020204" pitchFamily="34" charset="0"/>
+              </a:rPr>
+              <a:t>ku</a:t>
+            </a:r>
+            <a:r>
+              <a:rPr lang="en-US" sz="5400" b="1" dirty="0" smtClean="0">
                 <a:solidFill>
                   <a:srgbClr val="FFFF00"/>
                 </a:solidFill>
@@ -16024,10 +16315,19 @@
                 </a:solidFill>
                 <a:latin typeface="Arial Black" panose="020B0A04020102020204" pitchFamily="34" charset="0"/>
               </a:rPr>
-              <a:t>maha</a:t>
-            </a:r>
-            <a:r>
-              <a:rPr lang="en-US" sz="5400" b="1" dirty="0">
+              <a:t>M</a:t>
+            </a:r>
+            <a:r>
+              <a:rPr lang="en-US" sz="5400" b="1" dirty="0" err="1" smtClean="0">
+                <a:solidFill>
+                  <a:srgbClr val="FFFF00"/>
+                </a:solidFill>
+                <a:latin typeface="Arial Black" panose="020B0A04020102020204" pitchFamily="34" charset="0"/>
+              </a:rPr>
+              <a:t>aha</a:t>
+            </a:r>
+            <a:r>
+              <a:rPr lang="en-US" sz="5400" b="1" dirty="0" smtClean="0">
                 <a:solidFill>
                   <a:srgbClr val="FFFF00"/>
                 </a:solidFill>
@@ -16042,10 +16342,19 @@
                 </a:solidFill>
                 <a:latin typeface="Arial Black" panose="020B0A04020102020204" pitchFamily="34" charset="0"/>
               </a:rPr>
-              <a:t>luhur</a:t>
-            </a:r>
-            <a:r>
-              <a:rPr lang="en-US" sz="5400" b="1" dirty="0">
+              <a:t>L</a:t>
+            </a:r>
+            <a:r>
+              <a:rPr lang="en-US" sz="5400" b="1" dirty="0" err="1" smtClean="0">
+                <a:solidFill>
+                  <a:srgbClr val="FFFF00"/>
+                </a:solidFill>
+                <a:latin typeface="Arial Black" panose="020B0A04020102020204" pitchFamily="34" charset="0"/>
+              </a:rPr>
+              <a:t>uhur</a:t>
+            </a:r>
+            <a:r>
+              <a:rPr lang="en-US" sz="5400" b="1" dirty="0" smtClean="0">
                 <a:solidFill>
                   <a:srgbClr val="FFFF00"/>
                 </a:solidFill>
@@ -16053,12 +16362,6 @@
               </a:rPr>
               <a:t> </a:t>
             </a:r>
-            <a:endParaRPr lang="en-US" sz="5400" b="1" dirty="0" smtClean="0">
-              <a:solidFill>
-                <a:srgbClr val="FFFF00"/>
-              </a:solidFill>
-              <a:latin typeface="Arial Black" panose="020B0A04020102020204" pitchFamily="34" charset="0"/>
-            </a:endParaRPr>
           </a:p>
           <a:p>
             <a:pPr marL="0" indent="0" algn="ctr">
@@ -16089,10 +16392,19 @@
                 </a:solidFill>
                 <a:latin typeface="Arial Black" panose="020B0A04020102020204" pitchFamily="34" charset="0"/>
               </a:rPr>
-              <a:t>maha</a:t>
-            </a:r>
-            <a:r>
-              <a:rPr lang="en-US" sz="5400" b="1" dirty="0">
+              <a:t>M</a:t>
+            </a:r>
+            <a:r>
+              <a:rPr lang="en-US" sz="5400" b="1" dirty="0" err="1" smtClean="0">
+                <a:solidFill>
+                  <a:srgbClr val="FFFF00"/>
+                </a:solidFill>
+                <a:latin typeface="Arial Black" panose="020B0A04020102020204" pitchFamily="34" charset="0"/>
+              </a:rPr>
+              <a:t>aha</a:t>
+            </a:r>
+            <a:r>
+              <a:rPr lang="en-US" sz="5400" b="1" dirty="0" smtClean="0">
                 <a:solidFill>
                   <a:srgbClr val="FFFF00"/>
                 </a:solidFill>
@@ -16107,7 +16419,16 @@
                 </a:solidFill>
                 <a:latin typeface="Arial Black" panose="020B0A04020102020204" pitchFamily="34" charset="0"/>
               </a:rPr>
-              <a:t>mulya</a:t>
+              <a:t>M</a:t>
+            </a:r>
+            <a:r>
+              <a:rPr lang="en-US" sz="5400" b="1" dirty="0" err="1" smtClean="0">
+                <a:solidFill>
+                  <a:srgbClr val="FFFF00"/>
+                </a:solidFill>
+                <a:latin typeface="Arial Black" panose="020B0A04020102020204" pitchFamily="34" charset="0"/>
+              </a:rPr>
+              <a:t>ulya</a:t>
             </a:r>
             <a:endParaRPr lang="en-US" sz="5400" b="1" dirty="0">
               <a:solidFill>
@@ -17223,7 +17544,7 @@
                 <a:ea typeface="Calibri" panose="020F0502020204030204" pitchFamily="34" charset="0"/>
                 <a:cs typeface="Calibri" panose="020F0502020204030204" pitchFamily="34" charset="0"/>
               </a:rPr>
-              <a:t>duna</a:t>
+              <a:t>dina</a:t>
             </a:r>
             <a:r>
               <a:rPr lang="en-ID" sz="5400" b="1" dirty="0" smtClean="0">
@@ -17327,10 +17648,10 @@
                 <a:ea typeface="Calibri" panose="020F0502020204030204" pitchFamily="34" charset="0"/>
                 <a:cs typeface="Calibri" panose="020F0502020204030204" pitchFamily="34" charset="0"/>
               </a:rPr>
-              <a:t>jumutkeun</a:t>
-            </a:r>
-            <a:r>
-              <a:rPr lang="en-ID" sz="5400" b="1" dirty="0">
+              <a:t>n</a:t>
+            </a:r>
+            <a:r>
+              <a:rPr lang="en-ID" sz="5400" b="1" dirty="0" err="1" smtClean="0">
                 <a:solidFill>
                   <a:srgbClr val="FFFF00"/>
                 </a:solidFill>
@@ -17339,17 +17660,20 @@
                 <a:ea typeface="Calibri" panose="020F0502020204030204" pitchFamily="34" charset="0"/>
                 <a:cs typeface="Calibri" panose="020F0502020204030204" pitchFamily="34" charset="0"/>
               </a:rPr>
+              <a:t>umutkeun</a:t>
+            </a:r>
+            <a:r>
+              <a:rPr lang="en-ID" sz="5400" b="1" dirty="0" smtClean="0">
+                <a:solidFill>
+                  <a:srgbClr val="FFFF00"/>
+                </a:solidFill>
+                <a:effectLst/>
+                <a:latin typeface="Arial Black" panose="020B0A04020102020204" pitchFamily="34" charset="0"/>
+                <a:ea typeface="Calibri" panose="020F0502020204030204" pitchFamily="34" charset="0"/>
+                <a:cs typeface="Calibri" panose="020F0502020204030204" pitchFamily="34" charset="0"/>
+              </a:rPr>
               <a:t> </a:t>
             </a:r>
-            <a:endParaRPr lang="en-ID" sz="5400" b="1" dirty="0" smtClean="0">
-              <a:solidFill>
-                <a:srgbClr val="FFFF00"/>
-              </a:solidFill>
-              <a:effectLst/>
-              <a:latin typeface="Arial Black" panose="020B0A04020102020204" pitchFamily="34" charset="0"/>
-              <a:ea typeface="Calibri" panose="020F0502020204030204" pitchFamily="34" charset="0"/>
-              <a:cs typeface="Calibri" panose="020F0502020204030204" pitchFamily="34" charset="0"/>
-            </a:endParaRPr>
           </a:p>
           <a:p>
             <a:pPr marL="0" lvl="0" indent="0" algn="ctr">

</xml_diff>